<commit_message>
small fix to PBS script
</commit_message>
<xml_diff>
--- a/IntroToUnixHPC/03 HPC - Slides.pptx
+++ b/IntroToUnixHPC/03 HPC - Slides.pptx
@@ -11355,49 +11355,88 @@
                 <a:latin typeface="Courier New"/>
                 <a:ea typeface="ＭＳ Ｐゴシック"/>
               </a:rPr>
-              <a:t># * 1 node, 1 processor</a:t>
-            </a:r>
-          </a:p>
-          <a:p>
-            <a:r>
-              <a:rPr lang="en-AU" b="1" dirty="0">
+              <a:t># * 1 node, 1 </a:t>
+            </a:r>
+            <a:r>
+              <a:rPr lang="en-AU" dirty="0" smtClean="0">
                 <a:solidFill>
                   <a:srgbClr val="000000"/>
                 </a:solidFill>
                 <a:latin typeface="Courier New"/>
                 <a:ea typeface="ＭＳ Ｐゴシック"/>
               </a:rPr>
-              <a:t>#PBS </a:t>
-            </a:r>
-            <a:r>
-              <a:rPr lang="en-AU" b="1" dirty="0" smtClean="0">
-                <a:solidFill>
-                  <a:srgbClr val="FF0000"/>
+              <a:t>processor</a:t>
+            </a:r>
+          </a:p>
+          <a:p>
+            <a:r>
+              <a:rPr lang="en-AU" dirty="0">
+                <a:solidFill>
+                  <a:srgbClr val="000000"/>
                 </a:solidFill>
                 <a:latin typeface="Courier New"/>
                 <a:ea typeface="ＭＳ Ｐゴシック"/>
               </a:rPr>
-              <a:t>–l</a:t>
-            </a:r>
-            <a:r>
-              <a:rPr lang="en-AU" b="1" dirty="0" smtClean="0">
+              <a:t># * 100 megabytes physical memory allocated to </a:t>
+            </a:r>
+            <a:r>
+              <a:rPr lang="en-AU" dirty="0" smtClean="0">
                 <a:solidFill>
                   <a:srgbClr val="000000"/>
                 </a:solidFill>
                 <a:latin typeface="Courier New"/>
                 <a:ea typeface="ＭＳ Ｐゴシック"/>
               </a:rPr>
-              <a:t> select=1:ncpus=</a:t>
-            </a:r>
-            <a:r>
-              <a:rPr lang="en-AU" b="1" dirty="0" smtClean="0">
+              <a:t>job</a:t>
+            </a:r>
+            <a:endParaRPr lang="en-AU" dirty="0">
+              <a:solidFill>
+                <a:srgbClr val="000000"/>
+              </a:solidFill>
+              <a:latin typeface="Courier New"/>
+              <a:ea typeface="ＭＳ Ｐゴシック"/>
+            </a:endParaRPr>
+          </a:p>
+          <a:p>
+            <a:r>
+              <a:rPr lang="en-AU" b="1" dirty="0">
                 <a:solidFill>
                   <a:srgbClr val="000000"/>
                 </a:solidFill>
                 <a:latin typeface="Courier New"/>
                 <a:ea typeface="ＭＳ Ｐゴシック"/>
               </a:rPr>
-              <a:t>1</a:t>
+              <a:t>#PBS </a:t>
+            </a:r>
+            <a:r>
+              <a:rPr lang="en-AU" b="1" dirty="0" smtClean="0">
+                <a:solidFill>
+                  <a:srgbClr val="FF0000"/>
+                </a:solidFill>
+                <a:latin typeface="Courier New"/>
+                <a:ea typeface="ＭＳ Ｐゴシック"/>
+              </a:rPr>
+              <a:t>–l</a:t>
+            </a:r>
+            <a:r>
+              <a:rPr lang="en-AU" b="1" dirty="0" smtClean="0">
+                <a:solidFill>
+                  <a:srgbClr val="000000"/>
+                </a:solidFill>
+                <a:latin typeface="Courier New"/>
+                <a:ea typeface="ＭＳ Ｐゴシック"/>
+              </a:rPr>
+              <a:t> select=1:ncpus=</a:t>
+            </a:r>
+            <a:r>
+              <a:rPr lang="en-AU" b="1" dirty="0" smtClean="0">
+                <a:solidFill>
+                  <a:srgbClr val="000000"/>
+                </a:solidFill>
+                <a:latin typeface="Courier New"/>
+                <a:ea typeface="ＭＳ Ｐゴシック"/>
+              </a:rPr>
+              <a:t>1:mem=100mb</a:t>
             </a:r>
             <a:endParaRPr lang="en-AU" b="1" dirty="0" smtClean="0">
               <a:solidFill>
@@ -11406,85 +11445,6 @@
               <a:latin typeface="Courier New"/>
               <a:ea typeface="ＭＳ Ｐゴシック"/>
             </a:endParaRPr>
-          </a:p>
-          <a:p>
-            <a:r>
-              <a:rPr lang="en-AU" dirty="0" smtClean="0">
-                <a:solidFill>
-                  <a:srgbClr val="000000"/>
-                </a:solidFill>
-                <a:latin typeface="Courier New"/>
-                <a:ea typeface="ＭＳ Ｐゴシック"/>
-              </a:rPr>
-              <a:t># </a:t>
-            </a:r>
-            <a:r>
-              <a:rPr lang="en-AU" dirty="0">
-                <a:solidFill>
-                  <a:srgbClr val="000000"/>
-                </a:solidFill>
-                <a:latin typeface="Courier New"/>
-                <a:ea typeface="ＭＳ Ｐゴシック"/>
-              </a:rPr>
-              <a:t>* 100 megabytes physical memory allocated to job</a:t>
-            </a:r>
-          </a:p>
-          <a:p>
-            <a:pPr>
-              <a:lnSpc>
-                <a:spcPct val="100000"/>
-              </a:lnSpc>
-            </a:pPr>
-            <a:r>
-              <a:rPr lang="en-AU" b="1" dirty="0">
-                <a:solidFill>
-                  <a:srgbClr val="000000"/>
-                </a:solidFill>
-                <a:latin typeface="Courier New"/>
-                <a:ea typeface="ＭＳ Ｐゴシック"/>
-              </a:rPr>
-              <a:t>#PBS </a:t>
-            </a:r>
-            <a:r>
-              <a:rPr lang="en-AU" b="1" dirty="0">
-                <a:solidFill>
-                  <a:srgbClr val="FF0000"/>
-                </a:solidFill>
-                <a:latin typeface="Courier New"/>
-                <a:ea typeface="ＭＳ Ｐゴシック"/>
-              </a:rPr>
-              <a:t>-l</a:t>
-            </a:r>
-            <a:r>
-              <a:rPr lang="en-AU" b="1" dirty="0">
-                <a:solidFill>
-                  <a:srgbClr val="000000"/>
-                </a:solidFill>
-                <a:latin typeface="Courier New"/>
-                <a:ea typeface="ＭＳ Ｐゴシック"/>
-              </a:rPr>
-              <a:t> </a:t>
-            </a:r>
-            <a:r>
-              <a:rPr lang="en-AU" b="1" dirty="0" err="1">
-                <a:solidFill>
-                  <a:srgbClr val="000000"/>
-                </a:solidFill>
-                <a:latin typeface="Courier New"/>
-                <a:ea typeface="ＭＳ Ｐゴシック"/>
-              </a:rPr>
-              <a:t>mem</a:t>
-            </a:r>
-            <a:r>
-              <a:rPr lang="en-AU" b="1" dirty="0">
-                <a:solidFill>
-                  <a:srgbClr val="000000"/>
-                </a:solidFill>
-                <a:latin typeface="Courier New"/>
-                <a:ea typeface="ＭＳ Ｐゴシック"/>
-              </a:rPr>
-              <a:t>=100mb</a:t>
-            </a:r>
           </a:p>
           <a:p>
             <a:pPr>
@@ -12250,7 +12210,7 @@
           </a:p>
           <a:p>
             <a:r>
-              <a:rPr lang="en-AU" b="1" dirty="0">
+              <a:rPr lang="en-AU" dirty="0">
                 <a:solidFill>
                   <a:schemeClr val="bg1">
                     <a:lumMod val="50000"/>
@@ -12259,10 +12219,10 @@
                 <a:latin typeface="Courier New"/>
                 <a:ea typeface="ＭＳ Ｐゴシック"/>
               </a:rPr>
-              <a:t>#PBS </a:t>
-            </a:r>
-            <a:r>
-              <a:rPr lang="en-AU" b="1" dirty="0" smtClean="0">
+              <a:t># * 100 megabytes physical memory allocated to </a:t>
+            </a:r>
+            <a:r>
+              <a:rPr lang="en-AU" dirty="0" smtClean="0">
                 <a:solidFill>
                   <a:schemeClr val="bg1">
                     <a:lumMod val="50000"/>
@@ -12271,8 +12231,19 @@
                 <a:latin typeface="Courier New"/>
                 <a:ea typeface="ＭＳ Ｐゴシック"/>
               </a:rPr>
-              <a:t>–l select=1:ncpus=</a:t>
-            </a:r>
+              <a:t>job</a:t>
+            </a:r>
+            <a:endParaRPr lang="en-AU" b="1" dirty="0" smtClean="0">
+              <a:solidFill>
+                <a:schemeClr val="bg1">
+                  <a:lumMod val="50000"/>
+                </a:schemeClr>
+              </a:solidFill>
+              <a:latin typeface="Courier New"/>
+              <a:ea typeface="ＭＳ Ｐゴシック"/>
+            </a:endParaRPr>
+          </a:p>
+          <a:p>
             <a:r>
               <a:rPr lang="en-AU" b="1" dirty="0" smtClean="0">
                 <a:solidFill>
@@ -12283,12 +12254,10 @@
                 <a:latin typeface="Courier New"/>
                 <a:ea typeface="ＭＳ Ｐゴシック"/>
               </a:rPr>
-              <a:t>1</a:t>
-            </a:r>
-          </a:p>
-          <a:p>
-            <a:r>
-              <a:rPr lang="en-AU" dirty="0" smtClean="0">
+              <a:t>#</a:t>
+            </a:r>
+            <a:r>
+              <a:rPr lang="en-AU" b="1" dirty="0">
                 <a:solidFill>
                   <a:schemeClr val="bg1">
                     <a:lumMod val="50000"/>
@@ -12297,10 +12266,10 @@
                 <a:latin typeface="Courier New"/>
                 <a:ea typeface="ＭＳ Ｐゴシック"/>
               </a:rPr>
-              <a:t># </a:t>
-            </a:r>
-            <a:r>
-              <a:rPr lang="en-AU" dirty="0">
+              <a:t>PBS </a:t>
+            </a:r>
+            <a:r>
+              <a:rPr lang="en-AU" b="1" dirty="0" smtClean="0">
                 <a:solidFill>
                   <a:schemeClr val="bg1">
                     <a:lumMod val="50000"/>
@@ -12309,17 +12278,10 @@
                 <a:latin typeface="Courier New"/>
                 <a:ea typeface="ＭＳ Ｐゴシック"/>
               </a:rPr>
-              <a:t>* 100 megabytes physical memory allocated to job</a:t>
-            </a:r>
-          </a:p>
-          <a:p>
-            <a:pPr>
-              <a:lnSpc>
-                <a:spcPct val="100000"/>
-              </a:lnSpc>
-            </a:pPr>
-            <a:r>
-              <a:rPr lang="en-AU" b="1" dirty="0">
+              <a:t>–l select=1:ncpus=</a:t>
+            </a:r>
+            <a:r>
+              <a:rPr lang="en-AU" b="1" dirty="0" smtClean="0">
                 <a:solidFill>
                   <a:schemeClr val="bg1">
                     <a:lumMod val="50000"/>
@@ -12328,19 +12290,7 @@
                 <a:latin typeface="Courier New"/>
                 <a:ea typeface="ＭＳ Ｐゴシック"/>
               </a:rPr>
-              <a:t>#PBS -l </a:t>
-            </a:r>
-            <a:r>
-              <a:rPr lang="en-AU" b="1" dirty="0" err="1">
-                <a:solidFill>
-                  <a:schemeClr val="bg1">
-                    <a:lumMod val="50000"/>
-                  </a:schemeClr>
-                </a:solidFill>
-                <a:latin typeface="Courier New"/>
-                <a:ea typeface="ＭＳ Ｐゴシック"/>
-              </a:rPr>
-              <a:t>mem</a:t>
+              <a:t>1:mem</a:t>
             </a:r>
             <a:r>
               <a:rPr lang="en-AU" b="1" dirty="0">

</xml_diff>